<commit_message>
update UC and task 11 pptx
</commit_message>
<xml_diff>
--- a/PracticeTasks/Module2/Task_11/Task_11.pptx
+++ b/PracticeTasks/Module2/Task_11/Task_11.pptx
@@ -5,7 +5,7 @@
     <p:sldMasterId id="2147483659" r:id="rId1"/>
   </p:sldMasterIdLst>
   <p:notesMasterIdLst>
-    <p:notesMasterId r:id="rId9"/>
+    <p:notesMasterId r:id="rId13"/>
   </p:notesMasterIdLst>
   <p:sldIdLst>
     <p:sldId id="256" r:id="rId2"/>
@@ -14,7 +14,11 @@
     <p:sldId id="259" r:id="rId5"/>
     <p:sldId id="260" r:id="rId6"/>
     <p:sldId id="261" r:id="rId7"/>
-    <p:sldId id="262" r:id="rId8"/>
+    <p:sldId id="272" r:id="rId8"/>
+    <p:sldId id="270" r:id="rId9"/>
+    <p:sldId id="271" r:id="rId10"/>
+    <p:sldId id="269" r:id="rId11"/>
+    <p:sldId id="262" r:id="rId12"/>
   </p:sldIdLst>
   <p:sldSz cx="9144000" cy="5143500" type="screen16x9"/>
   <p:notesSz cx="6858000" cy="9144000"/>
@@ -811,6 +815,214 @@
 </p:notes>
 </file>
 
+<file path=ppt/notesSlides/notesSlide10.xml><?xml version="1.0" encoding="utf-8"?>
+<p:notes xmlns:a="http://schemas.openxmlformats.org/drawingml/2006/main" xmlns:r="http://schemas.openxmlformats.org/officeDocument/2006/relationships" xmlns:p="http://schemas.openxmlformats.org/presentationml/2006/main" showMasterSp="0" showMasterPhAnim="0">
+  <p:cSld>
+    <p:spTree>
+      <p:nvGrpSpPr>
+        <p:cNvPr id="1" name="Shape 80"/>
+        <p:cNvGrpSpPr/>
+        <p:nvPr/>
+      </p:nvGrpSpPr>
+      <p:grpSpPr>
+        <a:xfrm>
+          <a:off x="0" y="0"/>
+          <a:ext cx="0" cy="0"/>
+          <a:chOff x="0" y="0"/>
+          <a:chExt cx="0" cy="0"/>
+        </a:xfrm>
+      </p:grpSpPr>
+      <p:sp>
+        <p:nvSpPr>
+          <p:cNvPr id="81" name="Google Shape;81;g100adce3cd7_0_50:notes"/>
+          <p:cNvSpPr>
+            <a:spLocks noGrp="1" noRot="1" noChangeAspect="1"/>
+          </p:cNvSpPr>
+          <p:nvPr>
+            <p:ph type="sldImg" idx="2"/>
+          </p:nvPr>
+        </p:nvSpPr>
+        <p:spPr>
+          <a:xfrm>
+            <a:off x="381000" y="685800"/>
+            <a:ext cx="6096000" cy="3429000"/>
+          </a:xfrm>
+          <a:custGeom>
+            <a:avLst/>
+            <a:gdLst/>
+            <a:ahLst/>
+            <a:cxnLst/>
+            <a:rect l="l" t="t" r="r" b="b"/>
+            <a:pathLst>
+              <a:path w="120000" h="120000" extrusionOk="0">
+                <a:moveTo>
+                  <a:pt x="0" y="0"/>
+                </a:moveTo>
+                <a:lnTo>
+                  <a:pt x="120000" y="0"/>
+                </a:lnTo>
+                <a:lnTo>
+                  <a:pt x="120000" y="120000"/>
+                </a:lnTo>
+                <a:lnTo>
+                  <a:pt x="0" y="120000"/>
+                </a:lnTo>
+                <a:close/>
+              </a:path>
+            </a:pathLst>
+          </a:custGeom>
+        </p:spPr>
+      </p:sp>
+      <p:sp>
+        <p:nvSpPr>
+          <p:cNvPr id="82" name="Google Shape;82;g100adce3cd7_0_50:notes"/>
+          <p:cNvSpPr txBox="1">
+            <a:spLocks noGrp="1"/>
+          </p:cNvSpPr>
+          <p:nvPr>
+            <p:ph type="body" idx="1"/>
+          </p:nvPr>
+        </p:nvSpPr>
+        <p:spPr>
+          <a:xfrm>
+            <a:off x="685800" y="4343400"/>
+            <a:ext cx="5486400" cy="4114800"/>
+          </a:xfrm>
+          <a:prstGeom prst="rect">
+            <a:avLst/>
+          </a:prstGeom>
+        </p:spPr>
+        <p:txBody>
+          <a:bodyPr spcFirstLastPara="1" wrap="square" lIns="91425" tIns="91425" rIns="91425" bIns="91425" anchor="t" anchorCtr="0">
+            <a:noAutofit/>
+          </a:bodyPr>
+          <a:lstStyle/>
+          <a:p>
+            <a:pPr marL="0" lvl="0" indent="0" algn="l" rtl="0">
+              <a:spcBef>
+                <a:spcPts val="0"/>
+              </a:spcBef>
+              <a:spcAft>
+                <a:spcPts val="0"/>
+              </a:spcAft>
+              <a:buNone/>
+            </a:pPr>
+            <a:endParaRPr/>
+          </a:p>
+        </p:txBody>
+      </p:sp>
+    </p:spTree>
+  </p:cSld>
+  <p:clrMapOvr>
+    <a:masterClrMapping/>
+  </p:clrMapOvr>
+</p:notes>
+</file>
+
+<file path=ppt/notesSlides/notesSlide11.xml><?xml version="1.0" encoding="utf-8"?>
+<p:notes xmlns:a="http://schemas.openxmlformats.org/drawingml/2006/main" xmlns:r="http://schemas.openxmlformats.org/officeDocument/2006/relationships" xmlns:p="http://schemas.openxmlformats.org/presentationml/2006/main" showMasterSp="0" showMasterPhAnim="0">
+  <p:cSld>
+    <p:spTree>
+      <p:nvGrpSpPr>
+        <p:cNvPr id="1" name="Shape 89"/>
+        <p:cNvGrpSpPr/>
+        <p:nvPr/>
+      </p:nvGrpSpPr>
+      <p:grpSpPr>
+        <a:xfrm>
+          <a:off x="0" y="0"/>
+          <a:ext cx="0" cy="0"/>
+          <a:chOff x="0" y="0"/>
+          <a:chExt cx="0" cy="0"/>
+        </a:xfrm>
+      </p:grpSpPr>
+      <p:sp>
+        <p:nvSpPr>
+          <p:cNvPr id="90" name="Google Shape;90;g10396302928_0_8:notes"/>
+          <p:cNvSpPr>
+            <a:spLocks noGrp="1" noRot="1" noChangeAspect="1"/>
+          </p:cNvSpPr>
+          <p:nvPr>
+            <p:ph type="sldImg" idx="2"/>
+          </p:nvPr>
+        </p:nvSpPr>
+        <p:spPr>
+          <a:xfrm>
+            <a:off x="381000" y="685800"/>
+            <a:ext cx="6096000" cy="3429000"/>
+          </a:xfrm>
+          <a:custGeom>
+            <a:avLst/>
+            <a:gdLst/>
+            <a:ahLst/>
+            <a:cxnLst/>
+            <a:rect l="l" t="t" r="r" b="b"/>
+            <a:pathLst>
+              <a:path w="120000" h="120000" extrusionOk="0">
+                <a:moveTo>
+                  <a:pt x="0" y="0"/>
+                </a:moveTo>
+                <a:lnTo>
+                  <a:pt x="120000" y="0"/>
+                </a:lnTo>
+                <a:lnTo>
+                  <a:pt x="120000" y="120000"/>
+                </a:lnTo>
+                <a:lnTo>
+                  <a:pt x="0" y="120000"/>
+                </a:lnTo>
+                <a:close/>
+              </a:path>
+            </a:pathLst>
+          </a:custGeom>
+        </p:spPr>
+      </p:sp>
+      <p:sp>
+        <p:nvSpPr>
+          <p:cNvPr id="91" name="Google Shape;91;g10396302928_0_8:notes"/>
+          <p:cNvSpPr txBox="1">
+            <a:spLocks noGrp="1"/>
+          </p:cNvSpPr>
+          <p:nvPr>
+            <p:ph type="body" idx="1"/>
+          </p:nvPr>
+        </p:nvSpPr>
+        <p:spPr>
+          <a:xfrm>
+            <a:off x="685800" y="4343400"/>
+            <a:ext cx="5486400" cy="4114800"/>
+          </a:xfrm>
+          <a:prstGeom prst="rect">
+            <a:avLst/>
+          </a:prstGeom>
+        </p:spPr>
+        <p:txBody>
+          <a:bodyPr spcFirstLastPara="1" wrap="square" lIns="91425" tIns="91425" rIns="91425" bIns="91425" anchor="t" anchorCtr="0">
+            <a:noAutofit/>
+          </a:bodyPr>
+          <a:lstStyle/>
+          <a:p>
+            <a:pPr marL="0" lvl="0" indent="0" algn="l" rtl="0">
+              <a:spcBef>
+                <a:spcPts val="0"/>
+              </a:spcBef>
+              <a:spcAft>
+                <a:spcPts val="0"/>
+              </a:spcAft>
+              <a:buNone/>
+            </a:pPr>
+            <a:endParaRPr/>
+          </a:p>
+        </p:txBody>
+      </p:sp>
+    </p:spTree>
+  </p:cSld>
+  <p:clrMapOvr>
+    <a:masterClrMapping/>
+  </p:clrMapOvr>
+</p:notes>
+</file>
+
 <file path=ppt/notesSlides/notesSlide2.xml><?xml version="1.0" encoding="utf-8"?>
 <p:notes xmlns:a="http://schemas.openxmlformats.org/drawingml/2006/main" xmlns:r="http://schemas.openxmlformats.org/officeDocument/2006/relationships" xmlns:p="http://schemas.openxmlformats.org/presentationml/2006/main" showMasterSp="0" showMasterPhAnim="0">
   <p:cSld>
@@ -1341,7 +1553,7 @@
   <p:cSld>
     <p:spTree>
       <p:nvGrpSpPr>
-        <p:cNvPr id="1" name="Shape 89"/>
+        <p:cNvPr id="1" name="Shape 80"/>
         <p:cNvGrpSpPr/>
         <p:nvPr/>
       </p:nvGrpSpPr>
@@ -1355,7 +1567,7 @@
       </p:grpSpPr>
       <p:sp>
         <p:nvSpPr>
-          <p:cNvPr id="90" name="Google Shape;90;g10396302928_0_8:notes"/>
+          <p:cNvPr id="81" name="Google Shape;81;g100adce3cd7_0_50:notes"/>
           <p:cNvSpPr>
             <a:spLocks noGrp="1" noRot="1" noChangeAspect="1"/>
           </p:cNvSpPr>
@@ -1396,7 +1608,7 @@
       </p:sp>
       <p:sp>
         <p:nvSpPr>
-          <p:cNvPr id="91" name="Google Shape;91;g10396302928_0_8:notes"/>
+          <p:cNvPr id="82" name="Google Shape;82;g100adce3cd7_0_50:notes"/>
           <p:cNvSpPr txBox="1">
             <a:spLocks noGrp="1"/>
           </p:cNvSpPr>
@@ -1433,6 +1645,229 @@
         </p:txBody>
       </p:sp>
     </p:spTree>
+    <p:extLst>
+      <p:ext uri="{BB962C8B-B14F-4D97-AF65-F5344CB8AC3E}">
+        <p14:creationId xmlns:p14="http://schemas.microsoft.com/office/powerpoint/2010/main" val="1520451257"/>
+      </p:ext>
+    </p:extLst>
+  </p:cSld>
+  <p:clrMapOvr>
+    <a:masterClrMapping/>
+  </p:clrMapOvr>
+</p:notes>
+</file>
+
+<file path=ppt/notesSlides/notesSlide8.xml><?xml version="1.0" encoding="utf-8"?>
+<p:notes xmlns:a="http://schemas.openxmlformats.org/drawingml/2006/main" xmlns:r="http://schemas.openxmlformats.org/officeDocument/2006/relationships" xmlns:p="http://schemas.openxmlformats.org/presentationml/2006/main" showMasterSp="0" showMasterPhAnim="0">
+  <p:cSld>
+    <p:spTree>
+      <p:nvGrpSpPr>
+        <p:cNvPr id="1" name="Shape 80"/>
+        <p:cNvGrpSpPr/>
+        <p:nvPr/>
+      </p:nvGrpSpPr>
+      <p:grpSpPr>
+        <a:xfrm>
+          <a:off x="0" y="0"/>
+          <a:ext cx="0" cy="0"/>
+          <a:chOff x="0" y="0"/>
+          <a:chExt cx="0" cy="0"/>
+        </a:xfrm>
+      </p:grpSpPr>
+      <p:sp>
+        <p:nvSpPr>
+          <p:cNvPr id="81" name="Google Shape;81;g100adce3cd7_0_50:notes"/>
+          <p:cNvSpPr>
+            <a:spLocks noGrp="1" noRot="1" noChangeAspect="1"/>
+          </p:cNvSpPr>
+          <p:nvPr>
+            <p:ph type="sldImg" idx="2"/>
+          </p:nvPr>
+        </p:nvSpPr>
+        <p:spPr>
+          <a:xfrm>
+            <a:off x="381000" y="685800"/>
+            <a:ext cx="6096000" cy="3429000"/>
+          </a:xfrm>
+          <a:custGeom>
+            <a:avLst/>
+            <a:gdLst/>
+            <a:ahLst/>
+            <a:cxnLst/>
+            <a:rect l="l" t="t" r="r" b="b"/>
+            <a:pathLst>
+              <a:path w="120000" h="120000" extrusionOk="0">
+                <a:moveTo>
+                  <a:pt x="0" y="0"/>
+                </a:moveTo>
+                <a:lnTo>
+                  <a:pt x="120000" y="0"/>
+                </a:lnTo>
+                <a:lnTo>
+                  <a:pt x="120000" y="120000"/>
+                </a:lnTo>
+                <a:lnTo>
+                  <a:pt x="0" y="120000"/>
+                </a:lnTo>
+                <a:close/>
+              </a:path>
+            </a:pathLst>
+          </a:custGeom>
+        </p:spPr>
+      </p:sp>
+      <p:sp>
+        <p:nvSpPr>
+          <p:cNvPr id="82" name="Google Shape;82;g100adce3cd7_0_50:notes"/>
+          <p:cNvSpPr txBox="1">
+            <a:spLocks noGrp="1"/>
+          </p:cNvSpPr>
+          <p:nvPr>
+            <p:ph type="body" idx="1"/>
+          </p:nvPr>
+        </p:nvSpPr>
+        <p:spPr>
+          <a:xfrm>
+            <a:off x="685800" y="4343400"/>
+            <a:ext cx="5486400" cy="4114800"/>
+          </a:xfrm>
+          <a:prstGeom prst="rect">
+            <a:avLst/>
+          </a:prstGeom>
+        </p:spPr>
+        <p:txBody>
+          <a:bodyPr spcFirstLastPara="1" wrap="square" lIns="91425" tIns="91425" rIns="91425" bIns="91425" anchor="t" anchorCtr="0">
+            <a:noAutofit/>
+          </a:bodyPr>
+          <a:lstStyle/>
+          <a:p>
+            <a:pPr marL="0" lvl="0" indent="0" algn="l" rtl="0">
+              <a:spcBef>
+                <a:spcPts val="0"/>
+              </a:spcBef>
+              <a:spcAft>
+                <a:spcPts val="0"/>
+              </a:spcAft>
+              <a:buNone/>
+            </a:pPr>
+            <a:endParaRPr/>
+          </a:p>
+        </p:txBody>
+      </p:sp>
+    </p:spTree>
+    <p:extLst>
+      <p:ext uri="{BB962C8B-B14F-4D97-AF65-F5344CB8AC3E}">
+        <p14:creationId xmlns:p14="http://schemas.microsoft.com/office/powerpoint/2010/main" val="265012011"/>
+      </p:ext>
+    </p:extLst>
+  </p:cSld>
+  <p:clrMapOvr>
+    <a:masterClrMapping/>
+  </p:clrMapOvr>
+</p:notes>
+</file>
+
+<file path=ppt/notesSlides/notesSlide9.xml><?xml version="1.0" encoding="utf-8"?>
+<p:notes xmlns:a="http://schemas.openxmlformats.org/drawingml/2006/main" xmlns:r="http://schemas.openxmlformats.org/officeDocument/2006/relationships" xmlns:p="http://schemas.openxmlformats.org/presentationml/2006/main" showMasterSp="0" showMasterPhAnim="0">
+  <p:cSld>
+    <p:spTree>
+      <p:nvGrpSpPr>
+        <p:cNvPr id="1" name="Shape 80"/>
+        <p:cNvGrpSpPr/>
+        <p:nvPr/>
+      </p:nvGrpSpPr>
+      <p:grpSpPr>
+        <a:xfrm>
+          <a:off x="0" y="0"/>
+          <a:ext cx="0" cy="0"/>
+          <a:chOff x="0" y="0"/>
+          <a:chExt cx="0" cy="0"/>
+        </a:xfrm>
+      </p:grpSpPr>
+      <p:sp>
+        <p:nvSpPr>
+          <p:cNvPr id="81" name="Google Shape;81;g100adce3cd7_0_50:notes"/>
+          <p:cNvSpPr>
+            <a:spLocks noGrp="1" noRot="1" noChangeAspect="1"/>
+          </p:cNvSpPr>
+          <p:nvPr>
+            <p:ph type="sldImg" idx="2"/>
+          </p:nvPr>
+        </p:nvSpPr>
+        <p:spPr>
+          <a:xfrm>
+            <a:off x="381000" y="685800"/>
+            <a:ext cx="6096000" cy="3429000"/>
+          </a:xfrm>
+          <a:custGeom>
+            <a:avLst/>
+            <a:gdLst/>
+            <a:ahLst/>
+            <a:cxnLst/>
+            <a:rect l="l" t="t" r="r" b="b"/>
+            <a:pathLst>
+              <a:path w="120000" h="120000" extrusionOk="0">
+                <a:moveTo>
+                  <a:pt x="0" y="0"/>
+                </a:moveTo>
+                <a:lnTo>
+                  <a:pt x="120000" y="0"/>
+                </a:lnTo>
+                <a:lnTo>
+                  <a:pt x="120000" y="120000"/>
+                </a:lnTo>
+                <a:lnTo>
+                  <a:pt x="0" y="120000"/>
+                </a:lnTo>
+                <a:close/>
+              </a:path>
+            </a:pathLst>
+          </a:custGeom>
+        </p:spPr>
+      </p:sp>
+      <p:sp>
+        <p:nvSpPr>
+          <p:cNvPr id="82" name="Google Shape;82;g100adce3cd7_0_50:notes"/>
+          <p:cNvSpPr txBox="1">
+            <a:spLocks noGrp="1"/>
+          </p:cNvSpPr>
+          <p:nvPr>
+            <p:ph type="body" idx="1"/>
+          </p:nvPr>
+        </p:nvSpPr>
+        <p:spPr>
+          <a:xfrm>
+            <a:off x="685800" y="4343400"/>
+            <a:ext cx="5486400" cy="4114800"/>
+          </a:xfrm>
+          <a:prstGeom prst="rect">
+            <a:avLst/>
+          </a:prstGeom>
+        </p:spPr>
+        <p:txBody>
+          <a:bodyPr spcFirstLastPara="1" wrap="square" lIns="91425" tIns="91425" rIns="91425" bIns="91425" anchor="t" anchorCtr="0">
+            <a:noAutofit/>
+          </a:bodyPr>
+          <a:lstStyle/>
+          <a:p>
+            <a:pPr marL="0" lvl="0" indent="0" algn="l" rtl="0">
+              <a:spcBef>
+                <a:spcPts val="0"/>
+              </a:spcBef>
+              <a:spcAft>
+                <a:spcPts val="0"/>
+              </a:spcAft>
+              <a:buNone/>
+            </a:pPr>
+            <a:endParaRPr/>
+          </a:p>
+        </p:txBody>
+      </p:sp>
+    </p:spTree>
+    <p:extLst>
+      <p:ext uri="{BB962C8B-B14F-4D97-AF65-F5344CB8AC3E}">
+        <p14:creationId xmlns:p14="http://schemas.microsoft.com/office/powerpoint/2010/main" val="1537165346"/>
+      </p:ext>
+    </p:extLst>
   </p:cSld>
   <p:clrMapOvr>
     <a:masterClrMapping/>
@@ -6298,6 +6733,578 @@
 </p:sld>
 </file>
 
+<file path=ppt/slides/slide10.xml><?xml version="1.0" encoding="utf-8"?>
+<p:sld xmlns:a="http://schemas.openxmlformats.org/drawingml/2006/main" xmlns:r="http://schemas.openxmlformats.org/officeDocument/2006/relationships" xmlns:p="http://schemas.openxmlformats.org/presentationml/2006/main">
+  <p:cSld>
+    <p:spTree>
+      <p:nvGrpSpPr>
+        <p:cNvPr id="1" name="Shape 83"/>
+        <p:cNvGrpSpPr/>
+        <p:nvPr/>
+      </p:nvGrpSpPr>
+      <p:grpSpPr>
+        <a:xfrm>
+          <a:off x="0" y="0"/>
+          <a:ext cx="0" cy="0"/>
+          <a:chOff x="0" y="0"/>
+          <a:chExt cx="0" cy="0"/>
+        </a:xfrm>
+      </p:grpSpPr>
+      <p:sp>
+        <p:nvSpPr>
+          <p:cNvPr id="84" name="Google Shape;84;p18"/>
+          <p:cNvSpPr txBox="1">
+            <a:spLocks noGrp="1"/>
+          </p:cNvSpPr>
+          <p:nvPr>
+            <p:ph type="title"/>
+          </p:nvPr>
+        </p:nvSpPr>
+        <p:spPr>
+          <a:xfrm>
+            <a:off x="311700" y="209702"/>
+            <a:ext cx="8520600" cy="572700"/>
+          </a:xfrm>
+          <a:prstGeom prst="rect">
+            <a:avLst/>
+          </a:prstGeom>
+        </p:spPr>
+        <p:txBody>
+          <a:bodyPr spcFirstLastPara="1" wrap="square" lIns="91425" tIns="91425" rIns="91425" bIns="91425" anchor="t" anchorCtr="0">
+            <a:noAutofit/>
+          </a:bodyPr>
+          <a:lstStyle/>
+          <a:p>
+            <a:r>
+              <a:rPr lang="en-GB" dirty="0">
+                <a:effectLst>
+                  <a:outerShdw blurRad="38100" dist="38100" dir="2700000" algn="tl">
+                    <a:srgbClr val="000000">
+                      <a:alpha val="43137"/>
+                    </a:srgbClr>
+                  </a:outerShdw>
+                </a:effectLst>
+              </a:rPr>
+              <a:t>API usage </a:t>
+            </a:r>
+            <a:r>
+              <a:rPr lang="en-US" b="1" dirty="0" err="1">
+                <a:effectLst>
+                  <a:outerShdw blurRad="38100" dist="38100" dir="2700000" algn="tl">
+                    <a:srgbClr val="000000">
+                      <a:alpha val="43137"/>
+                    </a:srgbClr>
+                  </a:outerShdw>
+                </a:effectLst>
+              </a:rPr>
+              <a:t>ServiceDeployer</a:t>
+            </a:r>
+            <a:endParaRPr dirty="0">
+              <a:effectLst>
+                <a:outerShdw blurRad="38100" dist="38100" dir="2700000" algn="tl">
+                  <a:srgbClr val="000000">
+                    <a:alpha val="43137"/>
+                  </a:srgbClr>
+                </a:outerShdw>
+              </a:effectLst>
+            </a:endParaRPr>
+          </a:p>
+        </p:txBody>
+      </p:sp>
+      <p:sp>
+        <p:nvSpPr>
+          <p:cNvPr id="86" name="Google Shape;86;p18"/>
+          <p:cNvSpPr txBox="1">
+            <a:spLocks noGrp="1"/>
+          </p:cNvSpPr>
+          <p:nvPr>
+            <p:ph type="body" idx="1"/>
+          </p:nvPr>
+        </p:nvSpPr>
+        <p:spPr>
+          <a:xfrm>
+            <a:off x="311700" y="1152475"/>
+            <a:ext cx="3000300" cy="3416400"/>
+          </a:xfrm>
+          <a:prstGeom prst="rect">
+            <a:avLst/>
+          </a:prstGeom>
+        </p:spPr>
+        <p:txBody>
+          <a:bodyPr spcFirstLastPara="1" wrap="square" lIns="91425" tIns="91425" rIns="91425" bIns="91425" anchor="t" anchorCtr="0">
+            <a:noAutofit/>
+          </a:bodyPr>
+          <a:lstStyle/>
+          <a:p>
+            <a:pPr marL="0" lvl="0" indent="0" algn="l" rtl="0">
+              <a:spcBef>
+                <a:spcPts val="0"/>
+              </a:spcBef>
+              <a:spcAft>
+                <a:spcPts val="0"/>
+              </a:spcAft>
+              <a:buNone/>
+            </a:pPr>
+            <a:r>
+              <a:rPr lang="en-US" b="1" dirty="0">
+                <a:solidFill>
+                  <a:schemeClr val="tx1"/>
+                </a:solidFill>
+              </a:rPr>
+              <a:t>Use Case</a:t>
+            </a:r>
+            <a:r>
+              <a:rPr lang="en-US" dirty="0">
+                <a:solidFill>
+                  <a:schemeClr val="tx1"/>
+                </a:solidFill>
+              </a:rPr>
+              <a:t>: Deploy Service</a:t>
+            </a:r>
+          </a:p>
+          <a:p>
+            <a:pPr marL="0" lvl="0" indent="0" algn="l" rtl="0">
+              <a:spcBef>
+                <a:spcPts val="0"/>
+              </a:spcBef>
+              <a:spcAft>
+                <a:spcPts val="0"/>
+              </a:spcAft>
+              <a:buNone/>
+            </a:pPr>
+            <a:r>
+              <a:rPr lang="en-US" b="1" dirty="0">
+                <a:solidFill>
+                  <a:schemeClr val="tx1"/>
+                </a:solidFill>
+              </a:rPr>
+              <a:t>Scenario</a:t>
+            </a:r>
+            <a:r>
+              <a:rPr lang="en-US" dirty="0">
+                <a:solidFill>
+                  <a:schemeClr val="tx1"/>
+                </a:solidFill>
+              </a:rPr>
+              <a:t>:</a:t>
+            </a:r>
+          </a:p>
+          <a:p>
+            <a:pPr marL="0" lvl="0" indent="0" algn="l" rtl="0">
+              <a:spcBef>
+                <a:spcPts val="0"/>
+              </a:spcBef>
+              <a:spcAft>
+                <a:spcPts val="0"/>
+              </a:spcAft>
+              <a:buNone/>
+            </a:pPr>
+            <a:r>
+              <a:rPr lang="en-US" dirty="0">
+                <a:solidFill>
+                  <a:schemeClr val="tx1"/>
+                </a:solidFill>
+              </a:rPr>
+              <a:t>User sends request to deploy ML Model</a:t>
+            </a:r>
+          </a:p>
+          <a:p>
+            <a:pPr marL="0" lvl="0" indent="0" algn="l" rtl="0">
+              <a:spcBef>
+                <a:spcPts val="0"/>
+              </a:spcBef>
+              <a:spcAft>
+                <a:spcPts val="0"/>
+              </a:spcAft>
+              <a:buNone/>
+            </a:pPr>
+            <a:r>
+              <a:rPr lang="en-US" dirty="0">
+                <a:solidFill>
+                  <a:schemeClr val="tx1"/>
+                </a:solidFill>
+              </a:rPr>
+              <a:t>ML Wrappers creates docker container</a:t>
+            </a:r>
+          </a:p>
+          <a:p>
+            <a:pPr marL="0" lvl="0" indent="0" algn="l" rtl="0">
+              <a:spcBef>
+                <a:spcPts val="0"/>
+              </a:spcBef>
+              <a:spcAft>
+                <a:spcPts val="0"/>
+              </a:spcAft>
+              <a:buNone/>
+            </a:pPr>
+            <a:r>
+              <a:rPr lang="en-US" dirty="0">
+                <a:solidFill>
+                  <a:schemeClr val="tx1"/>
+                </a:solidFill>
+              </a:rPr>
+              <a:t>Docker container is deployed via service into K8s</a:t>
+            </a:r>
+          </a:p>
+        </p:txBody>
+      </p:sp>
+      <p:pic>
+        <p:nvPicPr>
+          <p:cNvPr id="5" name="Picture 4">
+            <a:extLst>
+              <a:ext uri="{FF2B5EF4-FFF2-40B4-BE49-F238E27FC236}">
+                <a16:creationId xmlns:a16="http://schemas.microsoft.com/office/drawing/2014/main" id="{F27EAB64-52E9-4F07-B4D9-407AD54431C9}"/>
+              </a:ext>
+            </a:extLst>
+          </p:cNvPr>
+          <p:cNvPicPr>
+            <a:picLocks noChangeAspect="1"/>
+          </p:cNvPicPr>
+          <p:nvPr/>
+        </p:nvPicPr>
+        <p:blipFill>
+          <a:blip r:embed="rId3"/>
+          <a:stretch>
+            <a:fillRect/>
+          </a:stretch>
+        </p:blipFill>
+        <p:spPr>
+          <a:xfrm>
+            <a:off x="3626541" y="1017725"/>
+            <a:ext cx="5205759" cy="3451009"/>
+          </a:xfrm>
+          <a:prstGeom prst="rect">
+            <a:avLst/>
+          </a:prstGeom>
+        </p:spPr>
+      </p:pic>
+      <p:sp>
+        <p:nvSpPr>
+          <p:cNvPr id="3" name="Номер слайда 2">
+            <a:extLst>
+              <a:ext uri="{FF2B5EF4-FFF2-40B4-BE49-F238E27FC236}">
+                <a16:creationId xmlns:a16="http://schemas.microsoft.com/office/drawing/2014/main" id="{3863259A-7CEE-49BB-9562-F93C8BD5800E}"/>
+              </a:ext>
+            </a:extLst>
+          </p:cNvPr>
+          <p:cNvSpPr>
+            <a:spLocks noGrp="1"/>
+          </p:cNvSpPr>
+          <p:nvPr>
+            <p:ph type="sldNum" idx="12"/>
+          </p:nvPr>
+        </p:nvSpPr>
+        <p:spPr/>
+        <p:txBody>
+          <a:bodyPr/>
+          <a:lstStyle/>
+          <a:p>
+            <a:pPr marL="0" lvl="0" indent="0" algn="r" rtl="0">
+              <a:spcBef>
+                <a:spcPts val="0"/>
+              </a:spcBef>
+              <a:spcAft>
+                <a:spcPts val="0"/>
+              </a:spcAft>
+              <a:buNone/>
+            </a:pPr>
+            <a:fld id="{00000000-1234-1234-1234-123412341234}" type="slidenum">
+              <a:rPr lang="en-GB" smtClean="0"/>
+              <a:t>10</a:t>
+            </a:fld>
+            <a:endParaRPr lang="en-GB"/>
+          </a:p>
+        </p:txBody>
+      </p:sp>
+    </p:spTree>
+  </p:cSld>
+  <p:clrMapOvr>
+    <a:masterClrMapping/>
+  </p:clrMapOvr>
+</p:sld>
+</file>
+
+<file path=ppt/slides/slide11.xml><?xml version="1.0" encoding="utf-8"?>
+<p:sld xmlns:a="http://schemas.openxmlformats.org/drawingml/2006/main" xmlns:r="http://schemas.openxmlformats.org/officeDocument/2006/relationships" xmlns:p="http://schemas.openxmlformats.org/presentationml/2006/main">
+  <p:cSld>
+    <p:spTree>
+      <p:nvGrpSpPr>
+        <p:cNvPr id="1" name="Shape 92"/>
+        <p:cNvGrpSpPr/>
+        <p:nvPr/>
+      </p:nvGrpSpPr>
+      <p:grpSpPr>
+        <a:xfrm>
+          <a:off x="0" y="0"/>
+          <a:ext cx="0" cy="0"/>
+          <a:chOff x="0" y="0"/>
+          <a:chExt cx="0" cy="0"/>
+        </a:xfrm>
+      </p:grpSpPr>
+      <p:sp>
+        <p:nvSpPr>
+          <p:cNvPr id="93" name="Google Shape;93;p19"/>
+          <p:cNvSpPr txBox="1">
+            <a:spLocks noGrp="1"/>
+          </p:cNvSpPr>
+          <p:nvPr>
+            <p:ph type="title"/>
+          </p:nvPr>
+        </p:nvSpPr>
+        <p:spPr>
+          <a:xfrm>
+            <a:off x="231018" y="182808"/>
+            <a:ext cx="8520600" cy="572700"/>
+          </a:xfrm>
+          <a:prstGeom prst="rect">
+            <a:avLst/>
+          </a:prstGeom>
+        </p:spPr>
+        <p:txBody>
+          <a:bodyPr spcFirstLastPara="1" wrap="square" lIns="91425" tIns="91425" rIns="91425" bIns="91425" anchor="t" anchorCtr="0">
+            <a:noAutofit/>
+          </a:bodyPr>
+          <a:lstStyle/>
+          <a:p>
+            <a:pPr marL="0" lvl="0" indent="0" algn="l" rtl="0">
+              <a:spcBef>
+                <a:spcPts val="0"/>
+              </a:spcBef>
+              <a:spcAft>
+                <a:spcPts val="0"/>
+              </a:spcAft>
+              <a:buNone/>
+            </a:pPr>
+            <a:r>
+              <a:rPr lang="en-GB" b="1" dirty="0">
+                <a:solidFill>
+                  <a:srgbClr val="FF0000"/>
+                </a:solidFill>
+                <a:effectLst>
+                  <a:outerShdw blurRad="38100" dist="38100" dir="2700000" algn="tl">
+                    <a:srgbClr val="000000">
+                      <a:alpha val="43137"/>
+                    </a:srgbClr>
+                  </a:outerShdw>
+                </a:effectLst>
+              </a:rPr>
+              <a:t>Team work</a:t>
+            </a:r>
+            <a:endParaRPr b="1" dirty="0">
+              <a:solidFill>
+                <a:srgbClr val="FF0000"/>
+              </a:solidFill>
+              <a:effectLst>
+                <a:outerShdw blurRad="38100" dist="38100" dir="2700000" algn="tl">
+                  <a:srgbClr val="000000">
+                    <a:alpha val="43137"/>
+                  </a:srgbClr>
+                </a:outerShdw>
+              </a:effectLst>
+            </a:endParaRPr>
+          </a:p>
+        </p:txBody>
+      </p:sp>
+      <p:sp>
+        <p:nvSpPr>
+          <p:cNvPr id="94" name="Google Shape;94;p19"/>
+          <p:cNvSpPr txBox="1">
+            <a:spLocks noGrp="1"/>
+          </p:cNvSpPr>
+          <p:nvPr>
+            <p:ph type="body" idx="1"/>
+          </p:nvPr>
+        </p:nvSpPr>
+        <p:spPr>
+          <a:xfrm>
+            <a:off x="311700" y="923875"/>
+            <a:ext cx="8520600" cy="3416400"/>
+          </a:xfrm>
+          <a:prstGeom prst="rect">
+            <a:avLst/>
+          </a:prstGeom>
+        </p:spPr>
+        <p:txBody>
+          <a:bodyPr spcFirstLastPara="1" wrap="square" lIns="91425" tIns="91425" rIns="91425" bIns="91425" anchor="t" anchorCtr="0">
+            <a:noAutofit/>
+          </a:bodyPr>
+          <a:lstStyle/>
+          <a:p>
+            <a:pPr marL="0" lvl="0" indent="0" algn="l" rtl="0">
+              <a:spcBef>
+                <a:spcPts val="0"/>
+              </a:spcBef>
+              <a:spcAft>
+                <a:spcPts val="1200"/>
+              </a:spcAft>
+              <a:buNone/>
+            </a:pPr>
+            <a:r>
+              <a:rPr lang="en-GB" dirty="0">
+                <a:solidFill>
+                  <a:schemeClr val="tx1"/>
+                </a:solidFill>
+              </a:rPr>
+              <a:t>Request Router – </a:t>
+            </a:r>
+            <a:r>
+              <a:rPr lang="en-GB" dirty="0" err="1">
+                <a:solidFill>
+                  <a:schemeClr val="tx1"/>
+                </a:solidFill>
+              </a:rPr>
+              <a:t>Tsaturyan</a:t>
+            </a:r>
+            <a:r>
+              <a:rPr lang="en-GB" dirty="0">
+                <a:solidFill>
+                  <a:schemeClr val="tx1"/>
+                </a:solidFill>
+              </a:rPr>
+              <a:t> Konstantin</a:t>
+            </a:r>
+          </a:p>
+          <a:p>
+            <a:pPr marL="0" lvl="0" indent="0" algn="l" rtl="0">
+              <a:spcBef>
+                <a:spcPts val="0"/>
+              </a:spcBef>
+              <a:spcAft>
+                <a:spcPts val="1200"/>
+              </a:spcAft>
+              <a:buNone/>
+            </a:pPr>
+            <a:r>
+              <a:rPr lang="en-GB" dirty="0">
+                <a:solidFill>
+                  <a:schemeClr val="tx1"/>
+                </a:solidFill>
+              </a:rPr>
+              <a:t>Authenticator – </a:t>
+            </a:r>
+            <a:r>
+              <a:rPr lang="en-GB" dirty="0" err="1">
+                <a:solidFill>
+                  <a:schemeClr val="tx1"/>
+                </a:solidFill>
+              </a:rPr>
+              <a:t>Dandamaev</a:t>
+            </a:r>
+            <a:r>
+              <a:rPr lang="en-GB" dirty="0">
+                <a:solidFill>
+                  <a:schemeClr val="tx1"/>
+                </a:solidFill>
+              </a:rPr>
+              <a:t> </a:t>
+            </a:r>
+            <a:r>
+              <a:rPr lang="en-GB" dirty="0" err="1">
+                <a:solidFill>
+                  <a:schemeClr val="tx1"/>
+                </a:solidFill>
+              </a:rPr>
+              <a:t>Gadji</a:t>
+            </a:r>
+            <a:endParaRPr lang="en-GB" dirty="0">
+              <a:solidFill>
+                <a:schemeClr val="tx1"/>
+              </a:solidFill>
+            </a:endParaRPr>
+          </a:p>
+          <a:p>
+            <a:pPr marL="0" lvl="0" indent="0" algn="l" rtl="0">
+              <a:spcBef>
+                <a:spcPts val="0"/>
+              </a:spcBef>
+              <a:spcAft>
+                <a:spcPts val="1200"/>
+              </a:spcAft>
+              <a:buNone/>
+            </a:pPr>
+            <a:r>
+              <a:rPr lang="en-GB" dirty="0" err="1">
+                <a:solidFill>
+                  <a:schemeClr val="tx1"/>
+                </a:solidFill>
+              </a:rPr>
+              <a:t>OpenAPI</a:t>
+            </a:r>
+            <a:r>
+              <a:rPr lang="en-GB" dirty="0">
+                <a:solidFill>
+                  <a:schemeClr val="tx1"/>
+                </a:solidFill>
+              </a:rPr>
+              <a:t> Generator – </a:t>
+            </a:r>
+            <a:r>
+              <a:rPr lang="en-GB" dirty="0" err="1">
+                <a:solidFill>
+                  <a:schemeClr val="tx1"/>
+                </a:solidFill>
+              </a:rPr>
+              <a:t>Tsurkan</a:t>
+            </a:r>
+            <a:r>
+              <a:rPr lang="en-GB" dirty="0">
+                <a:solidFill>
+                  <a:schemeClr val="tx1"/>
+                </a:solidFill>
+              </a:rPr>
+              <a:t> Daniel</a:t>
+            </a:r>
+          </a:p>
+          <a:p>
+            <a:pPr marL="0" lvl="0" indent="0" algn="l" rtl="0">
+              <a:spcBef>
+                <a:spcPts val="0"/>
+              </a:spcBef>
+              <a:spcAft>
+                <a:spcPts val="1200"/>
+              </a:spcAft>
+              <a:buNone/>
+            </a:pPr>
+            <a:r>
+              <a:rPr lang="en-GB" dirty="0">
+                <a:solidFill>
+                  <a:schemeClr val="tx1"/>
+                </a:solidFill>
+              </a:rPr>
+              <a:t>Service Deployer – </a:t>
+            </a:r>
+            <a:r>
+              <a:rPr lang="en-GB" dirty="0" err="1">
+                <a:solidFill>
+                  <a:schemeClr val="tx1"/>
+                </a:solidFill>
+              </a:rPr>
+              <a:t>Smolkin</a:t>
+            </a:r>
+            <a:r>
+              <a:rPr lang="en-GB" dirty="0">
+                <a:solidFill>
+                  <a:schemeClr val="tx1"/>
+                </a:solidFill>
+              </a:rPr>
+              <a:t> Mikhail</a:t>
+            </a:r>
+            <a:endParaRPr dirty="0">
+              <a:solidFill>
+                <a:schemeClr val="tx1"/>
+              </a:solidFill>
+            </a:endParaRPr>
+          </a:p>
+        </p:txBody>
+      </p:sp>
+    </p:spTree>
+  </p:cSld>
+  <p:clrMapOvr>
+    <a:masterClrMapping/>
+  </p:clrMapOvr>
+</p:sld>
+</file>
+
 <file path=ppt/slides/slide2.xml><?xml version="1.0" encoding="utf-8"?>
 <p:sld xmlns:a="http://schemas.openxmlformats.org/drawingml/2006/main" xmlns:r="http://schemas.openxmlformats.org/officeDocument/2006/relationships" xmlns:p="http://schemas.openxmlformats.org/presentationml/2006/main">
   <p:cSld>
@@ -6879,8 +7886,8 @@
         </p:nvSpPr>
         <p:spPr>
           <a:xfrm>
-            <a:off x="161364" y="4716463"/>
-            <a:ext cx="6400800" cy="523220"/>
+            <a:off x="161363" y="4716463"/>
+            <a:ext cx="8162365" cy="307777"/>
           </a:xfrm>
           <a:prstGeom prst="rect">
             <a:avLst/>
@@ -6896,16 +7903,14 @@
             <a:r>
               <a:rPr lang="en-US" dirty="0">
                 <a:solidFill>
-                  <a:srgbClr val="FF0000"/>
+                  <a:schemeClr val="tx1"/>
                 </a:solidFill>
               </a:rPr>
-              <a:t>Provide a link to structured textual use case scenarios in your project repo. </a:t>
+              <a:t>https://github.com/fanglores/Advanced-Software-Design/tree/master/General/UseCases</a:t>
             </a:r>
-          </a:p>
-          <a:p>
             <a:endParaRPr lang="ru-RU" dirty="0">
               <a:solidFill>
-                <a:srgbClr val="FF0000"/>
+                <a:schemeClr val="tx1"/>
               </a:solidFill>
             </a:endParaRPr>
           </a:p>
@@ -6920,7 +7925,7 @@
 </file>
 
 <file path=ppt/slides/slide4.xml><?xml version="1.0" encoding="utf-8"?>
-<p:sld xmlns:a="http://schemas.openxmlformats.org/drawingml/2006/main" xmlns:r="http://schemas.openxmlformats.org/officeDocument/2006/relationships" xmlns:p="http://schemas.openxmlformats.org/presentationml/2006/main">
+<p:sld xmlns:a="http://schemas.openxmlformats.org/drawingml/2006/main" xmlns:r="http://schemas.openxmlformats.org/officeDocument/2006/relationships" xmlns:p="http://schemas.openxmlformats.org/presentationml/2006/main" show="0">
   <p:cSld>
     <p:spTree>
       <p:nvGrpSpPr>
@@ -7119,7 +8124,7 @@
 </file>
 
 <file path=ppt/slides/slide5.xml><?xml version="1.0" encoding="utf-8"?>
-<p:sld xmlns:a="http://schemas.openxmlformats.org/drawingml/2006/main" xmlns:r="http://schemas.openxmlformats.org/officeDocument/2006/relationships" xmlns:p="http://schemas.openxmlformats.org/presentationml/2006/main">
+<p:sld xmlns:a="http://schemas.openxmlformats.org/drawingml/2006/main" xmlns:r="http://schemas.openxmlformats.org/officeDocument/2006/relationships" xmlns:p="http://schemas.openxmlformats.org/presentationml/2006/main" show="0">
   <p:cSld>
     <p:spTree>
       <p:nvGrpSpPr>
@@ -7300,7 +8305,7 @@
 </file>
 
 <file path=ppt/slides/slide6.xml><?xml version="1.0" encoding="utf-8"?>
-<p:sld xmlns:a="http://schemas.openxmlformats.org/drawingml/2006/main" xmlns:r="http://schemas.openxmlformats.org/officeDocument/2006/relationships" xmlns:p="http://schemas.openxmlformats.org/presentationml/2006/main">
+<p:sld xmlns:a="http://schemas.openxmlformats.org/drawingml/2006/main" xmlns:r="http://schemas.openxmlformats.org/officeDocument/2006/relationships" xmlns:p="http://schemas.openxmlformats.org/presentationml/2006/main" show="0">
   <p:cSld>
     <p:spTree>
       <p:nvGrpSpPr>
@@ -7453,7 +8458,7 @@
   <p:cSld>
     <p:spTree>
       <p:nvGrpSpPr>
-        <p:cNvPr id="1" name="Shape 92"/>
+        <p:cNvPr id="1" name="Shape 83"/>
         <p:cNvGrpSpPr/>
         <p:nvPr/>
       </p:nvGrpSpPr>
@@ -7467,7 +8472,7 @@
       </p:grpSpPr>
       <p:sp>
         <p:nvSpPr>
-          <p:cNvPr id="93" name="Google Shape;93;p19"/>
+          <p:cNvPr id="84" name="Google Shape;84;p18"/>
           <p:cNvSpPr txBox="1">
             <a:spLocks noGrp="1"/>
           </p:cNvSpPr>
@@ -7477,7 +8482,7 @@
         </p:nvSpPr>
         <p:spPr>
           <a:xfrm>
-            <a:off x="311700" y="445025"/>
+            <a:off x="311700" y="288275"/>
             <a:ext cx="8520600" cy="572700"/>
           </a:xfrm>
           <a:prstGeom prst="rect">
@@ -7490,34 +8495,361 @@
           </a:bodyPr>
           <a:lstStyle/>
           <a:p>
-            <a:pPr marL="0" lvl="0" indent="0" algn="l" rtl="0">
-              <a:spcBef>
-                <a:spcPts val="0"/>
-              </a:spcBef>
-              <a:spcAft>
-                <a:spcPts val="0"/>
-              </a:spcAft>
-              <a:buNone/>
-            </a:pPr>
             <a:r>
               <a:rPr lang="en-GB" dirty="0">
-                <a:solidFill>
-                  <a:srgbClr val="FF0000"/>
-                </a:solidFill>
+                <a:effectLst>
+                  <a:outerShdw blurRad="38100" dist="38100" dir="2700000" algn="tl">
+                    <a:srgbClr val="000000">
+                      <a:alpha val="43137"/>
+                    </a:srgbClr>
+                  </a:outerShdw>
+                </a:effectLst>
               </a:rPr>
-              <a:t>Team work</a:t>
+              <a:t>API usage </a:t>
+            </a:r>
+            <a:r>
+              <a:rPr lang="en-US" b="1" dirty="0" err="1">
+                <a:effectLst>
+                  <a:outerShdw blurRad="38100" dist="38100" dir="2700000" algn="tl">
+                    <a:srgbClr val="000000">
+                      <a:alpha val="43137"/>
+                    </a:srgbClr>
+                  </a:outerShdw>
+                </a:effectLst>
+              </a:rPr>
+              <a:t>RequestRouter</a:t>
             </a:r>
             <a:endParaRPr dirty="0">
-              <a:solidFill>
-                <a:srgbClr val="FF0000"/>
-              </a:solidFill>
+              <a:effectLst>
+                <a:outerShdw blurRad="38100" dist="38100" dir="2700000" algn="tl">
+                  <a:srgbClr val="000000">
+                    <a:alpha val="43137"/>
+                  </a:srgbClr>
+                </a:outerShdw>
+              </a:effectLst>
             </a:endParaRPr>
           </a:p>
         </p:txBody>
       </p:sp>
       <p:sp>
         <p:nvSpPr>
-          <p:cNvPr id="94" name="Google Shape;94;p19"/>
+          <p:cNvPr id="86" name="Google Shape;86;p18"/>
+          <p:cNvSpPr txBox="1">
+            <a:spLocks noGrp="1"/>
+          </p:cNvSpPr>
+          <p:nvPr>
+            <p:ph type="body" idx="1"/>
+          </p:nvPr>
+        </p:nvSpPr>
+        <p:spPr>
+          <a:xfrm>
+            <a:off x="311699" y="1152475"/>
+            <a:ext cx="3130747" cy="3416400"/>
+          </a:xfrm>
+          <a:prstGeom prst="rect">
+            <a:avLst/>
+          </a:prstGeom>
+        </p:spPr>
+        <p:txBody>
+          <a:bodyPr spcFirstLastPara="1" wrap="square" lIns="91425" tIns="91425" rIns="91425" bIns="91425" anchor="t" anchorCtr="0">
+            <a:noAutofit/>
+          </a:bodyPr>
+          <a:lstStyle/>
+          <a:p>
+            <a:pPr marL="0" lvl="0" indent="0" algn="l" rtl="0">
+              <a:spcBef>
+                <a:spcPts val="0"/>
+              </a:spcBef>
+              <a:spcAft>
+                <a:spcPts val="0"/>
+              </a:spcAft>
+              <a:buNone/>
+            </a:pPr>
+            <a:r>
+              <a:rPr lang="en-US" b="1" dirty="0">
+                <a:solidFill>
+                  <a:schemeClr val="tx1"/>
+                </a:solidFill>
+              </a:rPr>
+              <a:t>Use Case</a:t>
+            </a:r>
+            <a:r>
+              <a:rPr lang="en-US" dirty="0">
+                <a:solidFill>
+                  <a:schemeClr val="tx1"/>
+                </a:solidFill>
+              </a:rPr>
+              <a:t>: Forward Request</a:t>
+            </a:r>
+          </a:p>
+          <a:p>
+            <a:pPr marL="0" lvl="0" indent="0" algn="l" rtl="0">
+              <a:spcBef>
+                <a:spcPts val="0"/>
+              </a:spcBef>
+              <a:spcAft>
+                <a:spcPts val="0"/>
+              </a:spcAft>
+              <a:buNone/>
+            </a:pPr>
+            <a:r>
+              <a:rPr lang="en-US" b="1" dirty="0">
+                <a:solidFill>
+                  <a:schemeClr val="tx1"/>
+                </a:solidFill>
+              </a:rPr>
+              <a:t>Scenario</a:t>
+            </a:r>
+            <a:r>
+              <a:rPr lang="en-US" dirty="0">
+                <a:solidFill>
+                  <a:schemeClr val="tx1"/>
+                </a:solidFill>
+              </a:rPr>
+              <a:t>:</a:t>
+            </a:r>
+          </a:p>
+          <a:p>
+            <a:pPr marL="0" lvl="0" indent="0" algn="l" rtl="0">
+              <a:spcBef>
+                <a:spcPts val="0"/>
+              </a:spcBef>
+              <a:spcAft>
+                <a:spcPts val="0"/>
+              </a:spcAft>
+              <a:buNone/>
+            </a:pPr>
+            <a:r>
+              <a:rPr lang="en-US" dirty="0">
+                <a:solidFill>
+                  <a:schemeClr val="tx1"/>
+                </a:solidFill>
+              </a:rPr>
+              <a:t>User sends request to a service</a:t>
+            </a:r>
+          </a:p>
+          <a:p>
+            <a:pPr marL="0" lvl="0" indent="0" algn="l" rtl="0">
+              <a:spcBef>
+                <a:spcPts val="0"/>
+              </a:spcBef>
+              <a:spcAft>
+                <a:spcPts val="0"/>
+              </a:spcAft>
+              <a:buNone/>
+            </a:pPr>
+            <a:r>
+              <a:rPr lang="en-US" dirty="0">
+                <a:solidFill>
+                  <a:schemeClr val="tx1"/>
+                </a:solidFill>
+              </a:rPr>
+              <a:t>Request is being validated by </a:t>
+            </a:r>
+            <a:r>
+              <a:rPr lang="en-US" dirty="0" err="1">
+                <a:solidFill>
+                  <a:schemeClr val="tx1"/>
+                </a:solidFill>
+              </a:rPr>
+              <a:t>OpenAPI</a:t>
+            </a:r>
+            <a:r>
+              <a:rPr lang="en-US" dirty="0">
+                <a:solidFill>
+                  <a:schemeClr val="tx1"/>
+                </a:solidFill>
+              </a:rPr>
+              <a:t> schema</a:t>
+            </a:r>
+          </a:p>
+          <a:p>
+            <a:pPr marL="0" lvl="0" indent="0" algn="l" rtl="0">
+              <a:spcBef>
+                <a:spcPts val="0"/>
+              </a:spcBef>
+              <a:spcAft>
+                <a:spcPts val="0"/>
+              </a:spcAft>
+              <a:buNone/>
+            </a:pPr>
+            <a:r>
+              <a:rPr lang="en-US" dirty="0">
+                <a:solidFill>
+                  <a:schemeClr val="tx1"/>
+                </a:solidFill>
+              </a:rPr>
+              <a:t>Request is being forwarded to a specific K8s service</a:t>
+            </a:r>
+            <a:endParaRPr dirty="0">
+              <a:solidFill>
+                <a:schemeClr val="tx1"/>
+              </a:solidFill>
+            </a:endParaRPr>
+          </a:p>
+        </p:txBody>
+      </p:sp>
+      <p:pic>
+        <p:nvPicPr>
+          <p:cNvPr id="5" name="Picture 4">
+            <a:extLst>
+              <a:ext uri="{FF2B5EF4-FFF2-40B4-BE49-F238E27FC236}">
+                <a16:creationId xmlns:a16="http://schemas.microsoft.com/office/drawing/2014/main" id="{F27EAB64-52E9-4F07-B4D9-407AD54431C9}"/>
+              </a:ext>
+            </a:extLst>
+          </p:cNvPr>
+          <p:cNvPicPr>
+            <a:picLocks noChangeAspect="1"/>
+          </p:cNvPicPr>
+          <p:nvPr/>
+        </p:nvPicPr>
+        <p:blipFill>
+          <a:blip r:embed="rId3"/>
+          <a:srcRect/>
+          <a:stretch/>
+        </p:blipFill>
+        <p:spPr>
+          <a:xfrm>
+            <a:off x="3684063" y="1017725"/>
+            <a:ext cx="5090714" cy="3451009"/>
+          </a:xfrm>
+          <a:prstGeom prst="rect">
+            <a:avLst/>
+          </a:prstGeom>
+        </p:spPr>
+      </p:pic>
+      <p:sp>
+        <p:nvSpPr>
+          <p:cNvPr id="3" name="Номер слайда 2">
+            <a:extLst>
+              <a:ext uri="{FF2B5EF4-FFF2-40B4-BE49-F238E27FC236}">
+                <a16:creationId xmlns:a16="http://schemas.microsoft.com/office/drawing/2014/main" id="{44D00E36-7C80-4724-BC89-DAF8BBC2E470}"/>
+              </a:ext>
+            </a:extLst>
+          </p:cNvPr>
+          <p:cNvSpPr>
+            <a:spLocks noGrp="1"/>
+          </p:cNvSpPr>
+          <p:nvPr>
+            <p:ph type="sldNum" idx="12"/>
+          </p:nvPr>
+        </p:nvSpPr>
+        <p:spPr/>
+        <p:txBody>
+          <a:bodyPr/>
+          <a:lstStyle/>
+          <a:p>
+            <a:pPr marL="0" lvl="0" indent="0" algn="r" rtl="0">
+              <a:spcBef>
+                <a:spcPts val="0"/>
+              </a:spcBef>
+              <a:spcAft>
+                <a:spcPts val="0"/>
+              </a:spcAft>
+              <a:buNone/>
+            </a:pPr>
+            <a:fld id="{00000000-1234-1234-1234-123412341234}" type="slidenum">
+              <a:rPr lang="en-GB" smtClean="0"/>
+              <a:t>7</a:t>
+            </a:fld>
+            <a:endParaRPr lang="en-GB"/>
+          </a:p>
+        </p:txBody>
+      </p:sp>
+    </p:spTree>
+    <p:extLst>
+      <p:ext uri="{BB962C8B-B14F-4D97-AF65-F5344CB8AC3E}">
+        <p14:creationId xmlns:p14="http://schemas.microsoft.com/office/powerpoint/2010/main" val="1911688575"/>
+      </p:ext>
+    </p:extLst>
+  </p:cSld>
+  <p:clrMapOvr>
+    <a:masterClrMapping/>
+  </p:clrMapOvr>
+</p:sld>
+</file>
+
+<file path=ppt/slides/slide8.xml><?xml version="1.0" encoding="utf-8"?>
+<p:sld xmlns:a="http://schemas.openxmlformats.org/drawingml/2006/main" xmlns:r="http://schemas.openxmlformats.org/officeDocument/2006/relationships" xmlns:p="http://schemas.openxmlformats.org/presentationml/2006/main">
+  <p:cSld>
+    <p:spTree>
+      <p:nvGrpSpPr>
+        <p:cNvPr id="1" name="Shape 83"/>
+        <p:cNvGrpSpPr/>
+        <p:nvPr/>
+      </p:nvGrpSpPr>
+      <p:grpSpPr>
+        <a:xfrm>
+          <a:off x="0" y="0"/>
+          <a:ext cx="0" cy="0"/>
+          <a:chOff x="0" y="0"/>
+          <a:chExt cx="0" cy="0"/>
+        </a:xfrm>
+      </p:grpSpPr>
+      <p:sp>
+        <p:nvSpPr>
+          <p:cNvPr id="84" name="Google Shape;84;p18"/>
+          <p:cNvSpPr txBox="1">
+            <a:spLocks noGrp="1"/>
+          </p:cNvSpPr>
+          <p:nvPr>
+            <p:ph type="title"/>
+          </p:nvPr>
+        </p:nvSpPr>
+        <p:spPr>
+          <a:xfrm>
+            <a:off x="311700" y="182807"/>
+            <a:ext cx="8520600" cy="572700"/>
+          </a:xfrm>
+          <a:prstGeom prst="rect">
+            <a:avLst/>
+          </a:prstGeom>
+        </p:spPr>
+        <p:txBody>
+          <a:bodyPr spcFirstLastPara="1" wrap="square" lIns="91425" tIns="91425" rIns="91425" bIns="91425" anchor="t" anchorCtr="0">
+            <a:noAutofit/>
+          </a:bodyPr>
+          <a:lstStyle/>
+          <a:p>
+            <a:r>
+              <a:rPr lang="en-GB" dirty="0">
+                <a:effectLst>
+                  <a:outerShdw blurRad="38100" dist="38100" dir="2700000" algn="tl">
+                    <a:srgbClr val="000000">
+                      <a:alpha val="43137"/>
+                    </a:srgbClr>
+                  </a:outerShdw>
+                </a:effectLst>
+              </a:rPr>
+              <a:t>API usage </a:t>
+            </a:r>
+            <a:r>
+              <a:rPr lang="en-US" b="1" dirty="0">
+                <a:effectLst>
+                  <a:outerShdw blurRad="38100" dist="38100" dir="2700000" algn="tl">
+                    <a:srgbClr val="000000">
+                      <a:alpha val="43137"/>
+                    </a:srgbClr>
+                  </a:outerShdw>
+                </a:effectLst>
+              </a:rPr>
+              <a:t>Authenticator</a:t>
+            </a:r>
+            <a:endParaRPr dirty="0">
+              <a:effectLst>
+                <a:outerShdw blurRad="38100" dist="38100" dir="2700000" algn="tl">
+                  <a:srgbClr val="000000">
+                    <a:alpha val="43137"/>
+                  </a:srgbClr>
+                </a:outerShdw>
+              </a:effectLst>
+            </a:endParaRPr>
+          </a:p>
+        </p:txBody>
+      </p:sp>
+      <p:sp>
+        <p:nvSpPr>
+          <p:cNvPr id="86" name="Google Shape;86;p18"/>
           <p:cNvSpPr txBox="1">
             <a:spLocks noGrp="1"/>
           </p:cNvSpPr>
@@ -7528,7 +8860,7 @@
         <p:spPr>
           <a:xfrm>
             <a:off x="311700" y="1152475"/>
-            <a:ext cx="8520600" cy="3416400"/>
+            <a:ext cx="3000300" cy="3416400"/>
           </a:xfrm>
           <a:prstGeom prst="rect">
             <a:avLst/>
@@ -7545,19 +8877,631 @@
                 <a:spcPts val="0"/>
               </a:spcBef>
               <a:spcAft>
-                <a:spcPts val="1200"/>
+                <a:spcPts val="0"/>
               </a:spcAft>
               <a:buNone/>
             </a:pPr>
             <a:r>
-              <a:rPr lang="en-GB"/>
-              <a:t>&lt;Who did which DB schema for which microservice&gt;</a:t>
+              <a:rPr lang="en-US" b="1" dirty="0">
+                <a:solidFill>
+                  <a:schemeClr val="tx1"/>
+                </a:solidFill>
+              </a:rPr>
+              <a:t>Use Case</a:t>
             </a:r>
-            <a:endParaRPr/>
+            <a:r>
+              <a:rPr lang="en-US" dirty="0">
+                <a:solidFill>
+                  <a:schemeClr val="tx1"/>
+                </a:solidFill>
+              </a:rPr>
+              <a:t>: Authenticate</a:t>
+            </a:r>
+          </a:p>
+          <a:p>
+            <a:pPr marL="0" lvl="0" indent="0" algn="l" rtl="0">
+              <a:spcBef>
+                <a:spcPts val="0"/>
+              </a:spcBef>
+              <a:spcAft>
+                <a:spcPts val="0"/>
+              </a:spcAft>
+              <a:buNone/>
+            </a:pPr>
+            <a:r>
+              <a:rPr lang="en-US" b="1" dirty="0">
+                <a:solidFill>
+                  <a:schemeClr val="tx1"/>
+                </a:solidFill>
+              </a:rPr>
+              <a:t>Scenario</a:t>
+            </a:r>
+            <a:r>
+              <a:rPr lang="en-US" dirty="0">
+                <a:solidFill>
+                  <a:schemeClr val="tx1"/>
+                </a:solidFill>
+              </a:rPr>
+              <a:t>:</a:t>
+            </a:r>
+          </a:p>
+          <a:p>
+            <a:pPr marL="0" lvl="0" indent="0" algn="l" rtl="0">
+              <a:spcBef>
+                <a:spcPts val="0"/>
+              </a:spcBef>
+              <a:spcAft>
+                <a:spcPts val="0"/>
+              </a:spcAft>
+              <a:buNone/>
+            </a:pPr>
+            <a:r>
+              <a:rPr lang="en-US" dirty="0">
+                <a:solidFill>
+                  <a:schemeClr val="tx1"/>
+                </a:solidFill>
+              </a:rPr>
+              <a:t>User sends request</a:t>
+            </a:r>
+          </a:p>
+          <a:p>
+            <a:pPr marL="0" lvl="0" indent="0" algn="l" rtl="0">
+              <a:spcBef>
+                <a:spcPts val="0"/>
+              </a:spcBef>
+              <a:spcAft>
+                <a:spcPts val="0"/>
+              </a:spcAft>
+              <a:buNone/>
+            </a:pPr>
+            <a:r>
+              <a:rPr lang="en-US" dirty="0">
+                <a:solidFill>
+                  <a:schemeClr val="tx1"/>
+                </a:solidFill>
+              </a:rPr>
+              <a:t>Request is sent to authentication</a:t>
+            </a:r>
+          </a:p>
+          <a:p>
+            <a:pPr marL="0" lvl="0" indent="0" algn="l" rtl="0">
+              <a:spcBef>
+                <a:spcPts val="0"/>
+              </a:spcBef>
+              <a:spcAft>
+                <a:spcPts val="0"/>
+              </a:spcAft>
+              <a:buNone/>
+            </a:pPr>
+            <a:r>
+              <a:rPr lang="en-US" dirty="0">
+                <a:solidFill>
+                  <a:schemeClr val="tx1"/>
+                </a:solidFill>
+              </a:rPr>
+              <a:t>Request is checked for SSO authentication possibility</a:t>
+            </a:r>
+            <a:endParaRPr dirty="0">
+              <a:solidFill>
+                <a:schemeClr val="tx1"/>
+              </a:solidFill>
+            </a:endParaRPr>
+          </a:p>
+        </p:txBody>
+      </p:sp>
+      <p:pic>
+        <p:nvPicPr>
+          <p:cNvPr id="5" name="Picture 4">
+            <a:extLst>
+              <a:ext uri="{FF2B5EF4-FFF2-40B4-BE49-F238E27FC236}">
+                <a16:creationId xmlns:a16="http://schemas.microsoft.com/office/drawing/2014/main" id="{F27EAB64-52E9-4F07-B4D9-407AD54431C9}"/>
+              </a:ext>
+            </a:extLst>
+          </p:cNvPr>
+          <p:cNvPicPr>
+            <a:picLocks noChangeAspect="1"/>
+          </p:cNvPicPr>
+          <p:nvPr/>
+        </p:nvPicPr>
+        <p:blipFill>
+          <a:blip r:embed="rId3"/>
+          <a:srcRect/>
+          <a:stretch/>
+        </p:blipFill>
+        <p:spPr>
+          <a:xfrm>
+            <a:off x="3626541" y="2207056"/>
+            <a:ext cx="5205759" cy="1072347"/>
+          </a:xfrm>
+          <a:prstGeom prst="rect">
+            <a:avLst/>
+          </a:prstGeom>
+        </p:spPr>
+      </p:pic>
+      <p:sp>
+        <p:nvSpPr>
+          <p:cNvPr id="2" name="Rectangle 1">
+            <a:extLst>
+              <a:ext uri="{FF2B5EF4-FFF2-40B4-BE49-F238E27FC236}">
+                <a16:creationId xmlns:a16="http://schemas.microsoft.com/office/drawing/2014/main" id="{575A1C00-12C6-44D1-8DDB-5947204B7660}"/>
+              </a:ext>
+            </a:extLst>
+          </p:cNvPr>
+          <p:cNvSpPr>
+            <a:spLocks noChangeArrowheads="1"/>
+          </p:cNvSpPr>
+          <p:nvPr/>
+        </p:nvSpPr>
+        <p:spPr bwMode="auto">
+          <a:xfrm>
+            <a:off x="0" y="0"/>
+            <a:ext cx="9144000" cy="0"/>
+          </a:xfrm>
+          <a:prstGeom prst="rect">
+            <a:avLst/>
+          </a:prstGeom>
+          <a:noFill/>
+          <a:ln>
+            <a:noFill/>
+          </a:ln>
+          <a:effectLst/>
+          <a:extLst>
+            <a:ext uri="{909E8E84-426E-40DD-AFC4-6F175D3DCCD1}">
+              <a14:hiddenFill xmlns:a14="http://schemas.microsoft.com/office/drawing/2010/main">
+                <a:solidFill>
+                  <a:schemeClr val="accent1"/>
+                </a:solidFill>
+              </a14:hiddenFill>
+            </a:ext>
+            <a:ext uri="{91240B29-F687-4F45-9708-019B960494DF}">
+              <a14:hiddenLine xmlns:a14="http://schemas.microsoft.com/office/drawing/2010/main" w="9525">
+                <a:solidFill>
+                  <a:schemeClr val="tx1"/>
+                </a:solidFill>
+                <a:miter lim="800000"/>
+                <a:headEnd/>
+                <a:tailEnd/>
+              </a14:hiddenLine>
+            </a:ext>
+            <a:ext uri="{AF507438-7753-43E0-B8FC-AC1667EBCBE1}">
+              <a14:hiddenEffects xmlns:a14="http://schemas.microsoft.com/office/drawing/2010/main">
+                <a:effectLst>
+                  <a:outerShdw dist="35921" dir="2700000" algn="ctr" rotWithShape="0">
+                    <a:schemeClr val="bg2"/>
+                  </a:outerShdw>
+                </a:effectLst>
+              </a14:hiddenEffects>
+            </a:ext>
+          </a:extLst>
+        </p:spPr>
+        <p:txBody>
+          <a:bodyPr vert="horz" wrap="none" lIns="91440" tIns="45720" rIns="91440" bIns="45720" numCol="1" anchor="ctr" anchorCtr="0" compatLnSpc="1">
+            <a:prstTxWarp prst="textNoShape">
+              <a:avLst/>
+            </a:prstTxWarp>
+            <a:spAutoFit/>
+          </a:bodyPr>
+          <a:lstStyle/>
+          <a:p>
+            <a:pPr marL="0" marR="0" lvl="0" indent="0" algn="l" defTabSz="914400" rtl="0" eaLnBrk="0" fontAlgn="base" latinLnBrk="0" hangingPunct="0">
+              <a:lnSpc>
+                <a:spcPct val="100000"/>
+              </a:lnSpc>
+              <a:spcBef>
+                <a:spcPct val="0"/>
+              </a:spcBef>
+              <a:spcAft>
+                <a:spcPct val="0"/>
+              </a:spcAft>
+              <a:buClrTx/>
+              <a:buSzTx/>
+              <a:buFontTx/>
+              <a:buNone/>
+              <a:tabLst/>
+            </a:pPr>
+            <a:r>
+              <a:rPr kumimoji="0" lang="ru-RU" altLang="ru-RU" sz="300" b="1" i="0" u="none" strike="noStrike" cap="none" normalizeH="0" baseline="0">
+                <a:ln>
+                  <a:noFill/>
+                </a:ln>
+                <a:solidFill>
+                  <a:schemeClr val="tx1"/>
+                </a:solidFill>
+                <a:effectLst/>
+                <a:latin typeface="Arial" panose="020B0604020202020204" pitchFamily="34" charset="0"/>
+              </a:rPr>
+              <a:t>Authenticator</a:t>
+            </a:r>
+            <a:endParaRPr kumimoji="0" lang="ru-RU" altLang="ru-RU" sz="200" b="1" i="0" u="none" strike="noStrike" cap="none" normalizeH="0" baseline="0">
+              <a:ln>
+                <a:noFill/>
+              </a:ln>
+              <a:solidFill>
+                <a:schemeClr val="tx1"/>
+              </a:solidFill>
+              <a:effectLst/>
+              <a:latin typeface="Arial" panose="020B0604020202020204" pitchFamily="34" charset="0"/>
+            </a:endParaRPr>
+          </a:p>
+          <a:p>
+            <a:pPr marL="0" marR="0" lvl="0" indent="0" algn="l" defTabSz="914400" rtl="0" eaLnBrk="0" fontAlgn="base" latinLnBrk="0" hangingPunct="0">
+              <a:lnSpc>
+                <a:spcPct val="100000"/>
+              </a:lnSpc>
+              <a:spcBef>
+                <a:spcPct val="0"/>
+              </a:spcBef>
+              <a:spcAft>
+                <a:spcPct val="0"/>
+              </a:spcAft>
+              <a:buClrTx/>
+              <a:buSzTx/>
+              <a:buFontTx/>
+              <a:buNone/>
+              <a:tabLst/>
+            </a:pPr>
+            <a:endParaRPr kumimoji="0" lang="ru-RU" altLang="ru-RU" sz="1800" b="0" i="0" u="none" strike="noStrike" cap="none" normalizeH="0" baseline="0">
+              <a:ln>
+                <a:noFill/>
+              </a:ln>
+              <a:solidFill>
+                <a:schemeClr val="tx1"/>
+              </a:solidFill>
+              <a:effectLst/>
+              <a:latin typeface="Arial" panose="020B0604020202020204" pitchFamily="34" charset="0"/>
+            </a:endParaRPr>
+          </a:p>
+        </p:txBody>
+      </p:sp>
+      <p:sp>
+        <p:nvSpPr>
+          <p:cNvPr id="4" name="Номер слайда 3">
+            <a:extLst>
+              <a:ext uri="{FF2B5EF4-FFF2-40B4-BE49-F238E27FC236}">
+                <a16:creationId xmlns:a16="http://schemas.microsoft.com/office/drawing/2014/main" id="{B6084F2C-D079-4A3E-B51D-2E8680415742}"/>
+              </a:ext>
+            </a:extLst>
+          </p:cNvPr>
+          <p:cNvSpPr>
+            <a:spLocks noGrp="1"/>
+          </p:cNvSpPr>
+          <p:nvPr>
+            <p:ph type="sldNum" idx="12"/>
+          </p:nvPr>
+        </p:nvSpPr>
+        <p:spPr/>
+        <p:txBody>
+          <a:bodyPr/>
+          <a:lstStyle/>
+          <a:p>
+            <a:pPr marL="0" lvl="0" indent="0" algn="r" rtl="0">
+              <a:spcBef>
+                <a:spcPts val="0"/>
+              </a:spcBef>
+              <a:spcAft>
+                <a:spcPts val="0"/>
+              </a:spcAft>
+              <a:buNone/>
+            </a:pPr>
+            <a:fld id="{00000000-1234-1234-1234-123412341234}" type="slidenum">
+              <a:rPr lang="en-GB" smtClean="0"/>
+              <a:t>8</a:t>
+            </a:fld>
+            <a:endParaRPr lang="en-GB"/>
           </a:p>
         </p:txBody>
       </p:sp>
     </p:spTree>
+    <p:extLst>
+      <p:ext uri="{BB962C8B-B14F-4D97-AF65-F5344CB8AC3E}">
+        <p14:creationId xmlns:p14="http://schemas.microsoft.com/office/powerpoint/2010/main" val="3404193546"/>
+      </p:ext>
+    </p:extLst>
+  </p:cSld>
+  <p:clrMapOvr>
+    <a:masterClrMapping/>
+  </p:clrMapOvr>
+</p:sld>
+</file>
+
+<file path=ppt/slides/slide9.xml><?xml version="1.0" encoding="utf-8"?>
+<p:sld xmlns:a="http://schemas.openxmlformats.org/drawingml/2006/main" xmlns:r="http://schemas.openxmlformats.org/officeDocument/2006/relationships" xmlns:p="http://schemas.openxmlformats.org/presentationml/2006/main">
+  <p:cSld>
+    <p:spTree>
+      <p:nvGrpSpPr>
+        <p:cNvPr id="1" name="Shape 83"/>
+        <p:cNvGrpSpPr/>
+        <p:nvPr/>
+      </p:nvGrpSpPr>
+      <p:grpSpPr>
+        <a:xfrm>
+          <a:off x="0" y="0"/>
+          <a:ext cx="0" cy="0"/>
+          <a:chOff x="0" y="0"/>
+          <a:chExt cx="0" cy="0"/>
+        </a:xfrm>
+      </p:grpSpPr>
+      <p:sp>
+        <p:nvSpPr>
+          <p:cNvPr id="84" name="Google Shape;84;p18"/>
+          <p:cNvSpPr txBox="1">
+            <a:spLocks noGrp="1"/>
+          </p:cNvSpPr>
+          <p:nvPr>
+            <p:ph type="title"/>
+          </p:nvPr>
+        </p:nvSpPr>
+        <p:spPr>
+          <a:xfrm>
+            <a:off x="251188" y="288275"/>
+            <a:ext cx="8520600" cy="572700"/>
+          </a:xfrm>
+          <a:prstGeom prst="rect">
+            <a:avLst/>
+          </a:prstGeom>
+        </p:spPr>
+        <p:txBody>
+          <a:bodyPr spcFirstLastPara="1" wrap="square" lIns="91425" tIns="91425" rIns="91425" bIns="91425" anchor="t" anchorCtr="0">
+            <a:noAutofit/>
+          </a:bodyPr>
+          <a:lstStyle/>
+          <a:p>
+            <a:r>
+              <a:rPr lang="en-GB" dirty="0">
+                <a:effectLst>
+                  <a:outerShdw blurRad="38100" dist="38100" dir="2700000" algn="tl">
+                    <a:srgbClr val="000000">
+                      <a:alpha val="43137"/>
+                    </a:srgbClr>
+                  </a:outerShdw>
+                </a:effectLst>
+              </a:rPr>
+              <a:t>API usage </a:t>
+            </a:r>
+            <a:r>
+              <a:rPr lang="en-US" b="1" dirty="0" err="1">
+                <a:effectLst>
+                  <a:outerShdw blurRad="38100" dist="38100" dir="2700000" algn="tl">
+                    <a:srgbClr val="000000">
+                      <a:alpha val="43137"/>
+                    </a:srgbClr>
+                  </a:outerShdw>
+                </a:effectLst>
+              </a:rPr>
+              <a:t>OpenAPIGenerator</a:t>
+            </a:r>
+            <a:endParaRPr dirty="0">
+              <a:effectLst>
+                <a:outerShdw blurRad="38100" dist="38100" dir="2700000" algn="tl">
+                  <a:srgbClr val="000000">
+                    <a:alpha val="43137"/>
+                  </a:srgbClr>
+                </a:outerShdw>
+              </a:effectLst>
+            </a:endParaRPr>
+          </a:p>
+        </p:txBody>
+      </p:sp>
+      <p:sp>
+        <p:nvSpPr>
+          <p:cNvPr id="86" name="Google Shape;86;p18"/>
+          <p:cNvSpPr txBox="1">
+            <a:spLocks noGrp="1"/>
+          </p:cNvSpPr>
+          <p:nvPr>
+            <p:ph type="body" idx="1"/>
+          </p:nvPr>
+        </p:nvSpPr>
+        <p:spPr>
+          <a:xfrm>
+            <a:off x="311700" y="1152475"/>
+            <a:ext cx="3000300" cy="3416400"/>
+          </a:xfrm>
+          <a:prstGeom prst="rect">
+            <a:avLst/>
+          </a:prstGeom>
+        </p:spPr>
+        <p:txBody>
+          <a:bodyPr spcFirstLastPara="1" wrap="square" lIns="91425" tIns="91425" rIns="91425" bIns="91425" anchor="t" anchorCtr="0">
+            <a:noAutofit/>
+          </a:bodyPr>
+          <a:lstStyle/>
+          <a:p>
+            <a:pPr marL="0" lvl="0" indent="0" algn="l" rtl="0">
+              <a:spcBef>
+                <a:spcPts val="0"/>
+              </a:spcBef>
+              <a:spcAft>
+                <a:spcPts val="0"/>
+              </a:spcAft>
+              <a:buNone/>
+            </a:pPr>
+            <a:r>
+              <a:rPr lang="en-US" b="1" dirty="0">
+                <a:solidFill>
+                  <a:schemeClr val="tx1"/>
+                </a:solidFill>
+              </a:rPr>
+              <a:t>Use Case</a:t>
+            </a:r>
+            <a:r>
+              <a:rPr lang="en-US" dirty="0">
+                <a:solidFill>
+                  <a:schemeClr val="tx1"/>
+                </a:solidFill>
+              </a:rPr>
+              <a:t>: Generate </a:t>
+            </a:r>
+            <a:r>
+              <a:rPr lang="en-US" dirty="0" err="1">
+                <a:solidFill>
+                  <a:schemeClr val="tx1"/>
+                </a:solidFill>
+              </a:rPr>
+              <a:t>OpenAPI</a:t>
+            </a:r>
+            <a:r>
+              <a:rPr lang="en-US" dirty="0">
+                <a:solidFill>
+                  <a:schemeClr val="tx1"/>
+                </a:solidFill>
+              </a:rPr>
+              <a:t> Schema</a:t>
+            </a:r>
+          </a:p>
+          <a:p>
+            <a:pPr marL="0" lvl="0" indent="0" algn="l" rtl="0">
+              <a:spcBef>
+                <a:spcPts val="0"/>
+              </a:spcBef>
+              <a:spcAft>
+                <a:spcPts val="0"/>
+              </a:spcAft>
+              <a:buNone/>
+            </a:pPr>
+            <a:r>
+              <a:rPr lang="en-US" b="1" dirty="0">
+                <a:solidFill>
+                  <a:schemeClr val="tx1"/>
+                </a:solidFill>
+              </a:rPr>
+              <a:t>Scenario</a:t>
+            </a:r>
+            <a:r>
+              <a:rPr lang="en-US" dirty="0">
+                <a:solidFill>
+                  <a:schemeClr val="tx1"/>
+                </a:solidFill>
+              </a:rPr>
+              <a:t>: </a:t>
+            </a:r>
+          </a:p>
+          <a:p>
+            <a:pPr marL="0" lvl="0" indent="0" algn="l" rtl="0">
+              <a:spcBef>
+                <a:spcPts val="0"/>
+              </a:spcBef>
+              <a:spcAft>
+                <a:spcPts val="0"/>
+              </a:spcAft>
+              <a:buNone/>
+            </a:pPr>
+            <a:r>
+              <a:rPr lang="en-US" dirty="0">
+                <a:solidFill>
+                  <a:schemeClr val="tx1"/>
+                </a:solidFill>
+              </a:rPr>
+              <a:t>User sends request to get schema</a:t>
+            </a:r>
+          </a:p>
+          <a:p>
+            <a:pPr marL="0" lvl="0" indent="0" algn="l" rtl="0">
+              <a:spcBef>
+                <a:spcPts val="0"/>
+              </a:spcBef>
+              <a:spcAft>
+                <a:spcPts val="0"/>
+              </a:spcAft>
+              <a:buNone/>
+            </a:pPr>
+            <a:r>
+              <a:rPr lang="en-US" dirty="0" err="1">
+                <a:solidFill>
+                  <a:schemeClr val="tx1"/>
+                </a:solidFill>
+              </a:rPr>
+              <a:t>OpenApi</a:t>
+            </a:r>
+            <a:r>
+              <a:rPr lang="en-US" dirty="0">
+                <a:solidFill>
+                  <a:schemeClr val="tx1"/>
+                </a:solidFill>
+              </a:rPr>
+              <a:t> Generator checks if schema is present, if not – creates it, returns actual schema</a:t>
+            </a:r>
+            <a:endParaRPr dirty="0">
+              <a:solidFill>
+                <a:schemeClr val="tx1"/>
+              </a:solidFill>
+            </a:endParaRPr>
+          </a:p>
+        </p:txBody>
+      </p:sp>
+      <p:pic>
+        <p:nvPicPr>
+          <p:cNvPr id="5" name="Picture 4">
+            <a:extLst>
+              <a:ext uri="{FF2B5EF4-FFF2-40B4-BE49-F238E27FC236}">
+                <a16:creationId xmlns:a16="http://schemas.microsoft.com/office/drawing/2014/main" id="{F27EAB64-52E9-4F07-B4D9-407AD54431C9}"/>
+              </a:ext>
+            </a:extLst>
+          </p:cNvPr>
+          <p:cNvPicPr>
+            <a:picLocks noChangeAspect="1"/>
+          </p:cNvPicPr>
+          <p:nvPr/>
+        </p:nvPicPr>
+        <p:blipFill>
+          <a:blip r:embed="rId3"/>
+          <a:srcRect/>
+          <a:stretch/>
+        </p:blipFill>
+        <p:spPr>
+          <a:xfrm>
+            <a:off x="3626541" y="2203806"/>
+            <a:ext cx="5205759" cy="1078846"/>
+          </a:xfrm>
+          <a:prstGeom prst="rect">
+            <a:avLst/>
+          </a:prstGeom>
+        </p:spPr>
+      </p:pic>
+      <p:sp>
+        <p:nvSpPr>
+          <p:cNvPr id="3" name="Номер слайда 2">
+            <a:extLst>
+              <a:ext uri="{FF2B5EF4-FFF2-40B4-BE49-F238E27FC236}">
+                <a16:creationId xmlns:a16="http://schemas.microsoft.com/office/drawing/2014/main" id="{E92DA808-A119-4BC5-BB0C-E1F78E2DD16E}"/>
+              </a:ext>
+            </a:extLst>
+          </p:cNvPr>
+          <p:cNvSpPr>
+            <a:spLocks noGrp="1"/>
+          </p:cNvSpPr>
+          <p:nvPr>
+            <p:ph type="sldNum" idx="12"/>
+          </p:nvPr>
+        </p:nvSpPr>
+        <p:spPr/>
+        <p:txBody>
+          <a:bodyPr/>
+          <a:lstStyle/>
+          <a:p>
+            <a:pPr marL="0" lvl="0" indent="0" algn="r" rtl="0">
+              <a:spcBef>
+                <a:spcPts val="0"/>
+              </a:spcBef>
+              <a:spcAft>
+                <a:spcPts val="0"/>
+              </a:spcAft>
+              <a:buNone/>
+            </a:pPr>
+            <a:fld id="{00000000-1234-1234-1234-123412341234}" type="slidenum">
+              <a:rPr lang="en-GB" smtClean="0"/>
+              <a:t>9</a:t>
+            </a:fld>
+            <a:endParaRPr lang="en-GB"/>
+          </a:p>
+        </p:txBody>
+      </p:sp>
+    </p:spTree>
+    <p:extLst>
+      <p:ext uri="{BB962C8B-B14F-4D97-AF65-F5344CB8AC3E}">
+        <p14:creationId xmlns:p14="http://schemas.microsoft.com/office/powerpoint/2010/main" val="2388190616"/>
+      </p:ext>
+    </p:extLst>
   </p:cSld>
   <p:clrMapOvr>
     <a:masterClrMapping/>

</xml_diff>